<commit_message>
concurrency group by env
</commit_message>
<xml_diff>
--- a/AzureDotNetBicep-Workshop.pptx
+++ b/AzureDotNetBicep-Workshop.pptx
@@ -32200,7 +32200,7 @@
         </p:spPr>
         <p:txBody>
           <a:bodyPr>
-            <a:normAutofit/>
+            <a:normAutofit fontScale="90000"/>
           </a:bodyPr>
           <a:lstStyle/>
           <a:p>
@@ -32213,7 +32213,78 @@
                 <a:ea typeface="Open Sans" panose="020B0606030504020204" pitchFamily="34" charset="0"/>
                 <a:cs typeface="Open Sans" panose="020B0606030504020204" pitchFamily="34" charset="0"/>
               </a:rPr>
-              <a:t>Hands On</a:t>
+              <a:t>Hands </a:t>
+            </a:r>
+            <a:r>
+              <a:rPr lang="en-US" sz="9600" b="1">
+                <a:solidFill>
+                  <a:schemeClr val="bg1"/>
+                </a:solidFill>
+                <a:latin typeface="+mn-lt"/>
+                <a:ea typeface="Open Sans" panose="020B0606030504020204" pitchFamily="34" charset="0"/>
+                <a:cs typeface="Open Sans" panose="020B0606030504020204" pitchFamily="34" charset="0"/>
+              </a:rPr>
+              <a:t>On for 30 min</a:t>
+            </a:r>
+            <a:br>
+              <a:rPr lang="en-US" sz="9600" b="1" dirty="0">
+                <a:solidFill>
+                  <a:schemeClr val="bg1"/>
+                </a:solidFill>
+                <a:latin typeface="+mn-lt"/>
+                <a:ea typeface="Open Sans" panose="020B0606030504020204" pitchFamily="34" charset="0"/>
+                <a:cs typeface="Open Sans" panose="020B0606030504020204" pitchFamily="34" charset="0"/>
+              </a:rPr>
+            </a:br>
+            <a:r>
+              <a:rPr lang="en-US" sz="4000" b="1" dirty="0">
+                <a:solidFill>
+                  <a:schemeClr val="bg1"/>
+                </a:solidFill>
+                <a:latin typeface="+mn-lt"/>
+                <a:ea typeface="Open Sans" panose="020B0606030504020204" pitchFamily="34" charset="0"/>
+                <a:cs typeface="Open Sans" panose="020B0606030504020204" pitchFamily="34" charset="0"/>
+              </a:rPr>
+              <a:t>Module 4:</a:t>
+            </a:r>
+            <a:br>
+              <a:rPr lang="en-US" sz="4000" b="1" dirty="0">
+                <a:solidFill>
+                  <a:schemeClr val="bg1"/>
+                </a:solidFill>
+                <a:latin typeface="+mn-lt"/>
+                <a:ea typeface="Open Sans" panose="020B0606030504020204" pitchFamily="34" charset="0"/>
+                <a:cs typeface="Open Sans" panose="020B0606030504020204" pitchFamily="34" charset="0"/>
+              </a:rPr>
+            </a:br>
+            <a:r>
+              <a:rPr lang="en-US" sz="3300" b="1" dirty="0">
+                <a:solidFill>
+                  <a:schemeClr val="bg1"/>
+                </a:solidFill>
+                <a:latin typeface="+mn-lt"/>
+                <a:ea typeface="Open Sans" panose="020B0606030504020204" pitchFamily="34" charset="0"/>
+                <a:cs typeface="Open Sans" panose="020B0606030504020204" pitchFamily="34" charset="0"/>
+                <a:hlinkClick r:id="rId3">
+                  <a:extLst>
+                    <a:ext uri="{A12FA001-AC4F-418D-AE19-62706E023703}">
+                      <ahyp:hlinkClr xmlns:ahyp="http://schemas.microsoft.com/office/drawing/2018/hyperlinkcolor" val="tx"/>
+                    </a:ext>
+                  </a:extLst>
+                </a:hlinkClick>
+              </a:rPr>
+              <a:t>https://github.com/scottsauber/workshop-dotnet-azure-github-bicep</a:t>
+            </a:r>
+            <a:r>
+              <a:rPr lang="en-US" sz="3300" b="1" dirty="0">
+                <a:solidFill>
+                  <a:schemeClr val="bg1"/>
+                </a:solidFill>
+                <a:latin typeface="+mn-lt"/>
+                <a:ea typeface="Open Sans" panose="020B0606030504020204" pitchFamily="34" charset="0"/>
+                <a:cs typeface="Open Sans" panose="020B0606030504020204" pitchFamily="34" charset="0"/>
+              </a:rPr>
+              <a:t> </a:t>
             </a:r>
           </a:p>
         </p:txBody>
@@ -32233,7 +32304,7 @@
           <p:nvPr/>
         </p:nvPicPr>
         <p:blipFill>
-          <a:blip r:embed="rId3">
+          <a:blip r:embed="rId4">
             <a:extLst>
               <a:ext uri="{28A0092B-C50C-407E-A947-70E740481C1C}">
                 <a14:useLocalDpi xmlns:a14="http://schemas.microsoft.com/office/drawing/2010/main" val="0"/>

</xml_diff>